<commit_message>
updated powerpoint, fixed mistake in GCD problem
</commit_message>
<xml_diff>
--- a/IEEEXtreme Practice.pptx
+++ b/IEEEXtreme Practice.pptx
@@ -243,6 +243,9 @@
           </p14:sldIdLst>
         </p14:section>
       </p14:sectionLst>
+    </p:ext>
+    <p:ext uri="{EFAFB233-063F-42B5-8137-9DF3F51BA10A}">
+      <p15:sldGuideLst xmlns:p15="http://schemas.microsoft.com/office/powerpoint/2012/main"/>
     </p:ext>
   </p:extLst>
 </p:presentation>
@@ -13610,8 +13613,8 @@
           </a:p>
         </p:txBody>
       </p:sp>
-      <mc:AlternateContent xmlns:mc="http://schemas.openxmlformats.org/markup-compatibility/2006">
-        <mc:Choice xmlns:a14="http://schemas.microsoft.com/office/drawing/2010/main" Requires="a14">
+      <mc:AlternateContent xmlns:mc="http://schemas.openxmlformats.org/markup-compatibility/2006" xmlns:a14="http://schemas.microsoft.com/office/drawing/2010/main">
+        <mc:Choice Requires="a14">
           <p:sp>
             <p:nvSpPr>
               <p:cNvPr id="18" name="Rectangle 17"/>
@@ -13982,7 +13985,7 @@
             </p:txBody>
           </p:sp>
         </mc:Choice>
-        <mc:Fallback>
+        <mc:Fallback xmlns="">
           <p:sp>
             <p:nvSpPr>
               <p:cNvPr id="18" name="Rectangle 17"/>
@@ -14062,8 +14065,8 @@
           </a:extLst>
         </p:spPr>
       </p:pic>
-      <mc:AlternateContent xmlns:mc="http://schemas.openxmlformats.org/markup-compatibility/2006">
-        <mc:Choice xmlns:a14="http://schemas.microsoft.com/office/drawing/2010/main" Requires="a14">
+      <mc:AlternateContent xmlns:mc="http://schemas.openxmlformats.org/markup-compatibility/2006" xmlns:a14="http://schemas.microsoft.com/office/drawing/2010/main">
+        <mc:Choice Requires="a14">
           <p:sp>
             <p:nvSpPr>
               <p:cNvPr id="20" name="Rectangle 19"/>
@@ -14434,7 +14437,7 @@
             </p:txBody>
           </p:sp>
         </mc:Choice>
-        <mc:Fallback>
+        <mc:Fallback xmlns="">
           <p:sp>
             <p:nvSpPr>
               <p:cNvPr id="20" name="Rectangle 19"/>
@@ -15602,11 +15605,7 @@
             </a:pPr>
             <a:r>
               <a:rPr lang="en-CA" dirty="0" smtClean="0"/>
-              <a:t>	</a:t>
-            </a:r>
-            <a:r>
-              <a:rPr lang="en-CA" dirty="0" smtClean="0"/>
-              <a:t>L(</a:t>
+              <a:t>	L(</a:t>
             </a:r>
             <a:r>
               <a:rPr lang="en-CA" dirty="0" err="1" smtClean="0"/>
@@ -15669,11 +15668,7 @@
             <a:pPr lvl="3"/>
             <a:r>
               <a:rPr lang="en-CA" dirty="0" smtClean="0"/>
-              <a:t>If the characters do not match, t</a:t>
-            </a:r>
-            <a:r>
-              <a:rPr lang="en-CA" dirty="0" smtClean="0"/>
-              <a:t>ake the longest of the other two options:</a:t>
+              <a:t>If the characters do not match, take the longest of the other two options:</a:t>
             </a:r>
           </a:p>
           <a:p>
@@ -16094,11 +16089,7 @@
             <a:pPr lvl="1"/>
             <a:r>
               <a:rPr lang="en-CA" dirty="0" smtClean="0"/>
-              <a:t>Build a table of size (n+1) x (m+1), start at </a:t>
-            </a:r>
-            <a:r>
-              <a:rPr lang="en-CA" dirty="0" smtClean="0"/>
-              <a:t>L(X</a:t>
+              <a:t>Build a table of size (n+1) x (m+1), start at L(X</a:t>
             </a:r>
             <a:r>
               <a:rPr lang="en-CA" baseline="-25000" dirty="0" smtClean="0"/>
@@ -20480,13 +20471,8 @@
                       </a:pPr>
                       <a:r>
                         <a:rPr lang="en-CA" sz="1400" dirty="0" smtClean="0"/>
-                        <a:t>{</a:t>
-                      </a:r>
-                      <a:r>
-                        <a:rPr lang="en-CA" sz="1400" dirty="0" smtClean="0"/>
-                        <a:t>OTE, TTE}</a:t>
-                      </a:r>
-                      <a:endParaRPr lang="en-CA" sz="1400" dirty="0" smtClean="0"/>
+                        <a:t>{OTE, TTE}</a:t>
+                      </a:r>
                     </a:p>
                   </a:txBody>
                   <a:tcPr/>
@@ -20517,7 +20503,6 @@
                         <a:rPr lang="en-CA" sz="1400" dirty="0" smtClean="0"/>
                         <a:t>{OTE, TTE}</a:t>
                       </a:r>
-                      <a:endParaRPr lang="en-CA" sz="1400" dirty="0" smtClean="0"/>
                     </a:p>
                   </a:txBody>
                   <a:tcPr/>
@@ -20548,7 +20533,6 @@
                         <a:rPr lang="en-CA" sz="1400" dirty="0" smtClean="0"/>
                         <a:t>{OTE, TTE}</a:t>
                       </a:r>
-                      <a:endParaRPr lang="en-CA" sz="1400" dirty="0" smtClean="0"/>
                     </a:p>
                   </a:txBody>
                   <a:tcPr/>
@@ -20757,13 +20741,8 @@
                       </a:pPr>
                       <a:r>
                         <a:rPr lang="en-CA" sz="1400" dirty="0" smtClean="0"/>
-                        <a:t>{</a:t>
-                      </a:r>
-                      <a:r>
-                        <a:rPr lang="en-CA" sz="1400" dirty="0" smtClean="0"/>
-                        <a:t>OTER, TTER}</a:t>
-                      </a:r>
-                      <a:endParaRPr lang="en-CA" sz="1400" dirty="0" smtClean="0"/>
+                        <a:t>{OTER, TTER}</a:t>
+                      </a:r>
                     </a:p>
                   </a:txBody>
                   <a:tcPr/>
@@ -20794,7 +20773,6 @@
                         <a:rPr lang="en-CA" sz="1400" dirty="0" smtClean="0"/>
                         <a:t>{OTER, TTER}</a:t>
                       </a:r>
-                      <a:endParaRPr lang="en-CA" sz="1400" dirty="0" smtClean="0"/>
                     </a:p>
                   </a:txBody>
                   <a:tcPr/>
@@ -45332,8 +45310,13 @@
             </a:br>
             <a:r>
               <a:rPr lang="en-CA" dirty="0" smtClean="0"/>
-              <a:t>                              = 10*(2^3-1) = 50</a:t>
-            </a:r>
+              <a:t>                              = 10*(2^3-1) = </a:t>
+            </a:r>
+            <a:r>
+              <a:rPr lang="en-CA" dirty="0" smtClean="0"/>
+              <a:t>70</a:t>
+            </a:r>
+            <a:endParaRPr lang="en-CA" dirty="0" smtClean="0"/>
           </a:p>
         </p:txBody>
       </p:sp>
@@ -45388,8 +45371,13 @@
             </a:r>
             <a:r>
               <a:rPr lang="en-CA" dirty="0"/>
-              <a:t>) = 5</a:t>
-            </a:r>
+              <a:t>) = </a:t>
+            </a:r>
+            <a:r>
+              <a:rPr lang="en-CA" dirty="0" smtClean="0"/>
+              <a:t>7</a:t>
+            </a:r>
+            <a:endParaRPr lang="en-CA" dirty="0"/>
           </a:p>
         </p:txBody>
       </p:sp>
@@ -45448,7 +45436,7 @@
             </a:r>
             <a:r>
               <a:rPr lang="en-CA" dirty="0" smtClean="0"/>
-              <a:t>15</a:t>
+              <a:t>21</a:t>
             </a:r>
             <a:endParaRPr lang="en-CA" dirty="0"/>
           </a:p>
@@ -45505,8 +45493,13 @@
             </a:r>
             <a:r>
               <a:rPr lang="en-CA" dirty="0"/>
-              <a:t>) = 5</a:t>
-            </a:r>
+              <a:t>) = </a:t>
+            </a:r>
+            <a:r>
+              <a:rPr lang="en-CA" dirty="0" smtClean="0"/>
+              <a:t>7</a:t>
+            </a:r>
+            <a:endParaRPr lang="en-CA" dirty="0"/>
           </a:p>
         </p:txBody>
       </p:sp>
@@ -45628,8 +45621,8 @@
           </a:p>
         </p:txBody>
       </p:sp>
-      <mc:AlternateContent xmlns:mc="http://schemas.openxmlformats.org/markup-compatibility/2006">
-        <mc:Choice xmlns:a14="http://schemas.microsoft.com/office/drawing/2010/main" Requires="a14">
+      <mc:AlternateContent xmlns:mc="http://schemas.openxmlformats.org/markup-compatibility/2006" xmlns:a14="http://schemas.microsoft.com/office/drawing/2010/main">
+        <mc:Choice Requires="a14">
           <p:sp>
             <p:nvSpPr>
               <p:cNvPr id="3" name="Content Placeholder 2"/>
@@ -45765,7 +45758,7 @@
             </p:txBody>
           </p:sp>
         </mc:Choice>
-        <mc:Fallback>
+        <mc:Fallback xmlns="">
           <p:sp>
             <p:nvSpPr>
               <p:cNvPr id="3" name="Content Placeholder 2"/>
@@ -47193,8 +47186,13 @@
             </a:br>
             <a:r>
               <a:rPr lang="en-CA" dirty="0" smtClean="0"/>
-              <a:t>                              = 10*(2^3-1) = 50</a:t>
-            </a:r>
+              <a:t>                              = 10*(2^3-1) = </a:t>
+            </a:r>
+            <a:r>
+              <a:rPr lang="en-CA" dirty="0" smtClean="0"/>
+              <a:t>70</a:t>
+            </a:r>
+            <a:endParaRPr lang="en-CA" dirty="0" smtClean="0"/>
           </a:p>
         </p:txBody>
       </p:sp>
@@ -47249,8 +47247,13 @@
             </a:r>
             <a:r>
               <a:rPr lang="en-CA" dirty="0"/>
-              <a:t>) = 5</a:t>
-            </a:r>
+              <a:t>) = </a:t>
+            </a:r>
+            <a:r>
+              <a:rPr lang="en-CA" dirty="0" smtClean="0"/>
+              <a:t>7</a:t>
+            </a:r>
+            <a:endParaRPr lang="en-CA" dirty="0"/>
           </a:p>
         </p:txBody>
       </p:sp>
@@ -47309,7 +47312,7 @@
             </a:r>
             <a:r>
               <a:rPr lang="en-CA" dirty="0" smtClean="0"/>
-              <a:t>15</a:t>
+              <a:t>21</a:t>
             </a:r>
             <a:endParaRPr lang="en-CA" dirty="0"/>
           </a:p>
@@ -47366,8 +47369,13 @@
             </a:r>
             <a:r>
               <a:rPr lang="en-CA" dirty="0"/>
-              <a:t>) = 5</a:t>
-            </a:r>
+              <a:t>) = </a:t>
+            </a:r>
+            <a:r>
+              <a:rPr lang="en-CA" dirty="0" smtClean="0"/>
+              <a:t>7</a:t>
+            </a:r>
+            <a:endParaRPr lang="en-CA" dirty="0"/>
           </a:p>
         </p:txBody>
       </p:sp>

</xml_diff>